<commit_message>
Update vignettes example datasets.
</commit_message>
<xml_diff>
--- a/figures/lancer_logo.pptx
+++ b/figures/lancer_logo.pptx
@@ -13900,7 +13900,7 @@
           <p:nvPr>
             <p:extLst>
               <p:ext uri="{D42A27DB-BD31-4B8C-83A1-F6EECF244321}">
-                <p14:modId xmlns:p14="http://schemas.microsoft.com/office/powerpoint/2010/main" val="704711961"/>
+                <p14:modId xmlns:p14="http://schemas.microsoft.com/office/powerpoint/2010/main" val="2442514810"/>
               </p:ext>
             </p:extLst>
           </p:nvPr>
@@ -14027,7 +14027,7 @@
                             <a:schemeClr val="tx1"/>
                           </a:solidFill>
                         </a:rPr>
-                        <a:t>Curve</a:t>
+                        <a:t>Curve Batch</a:t>
                       </a:r>
                     </a:p>
                     <a:p>
@@ -14474,7 +14474,7 @@
           <p:nvPr>
             <p:extLst>
               <p:ext uri="{D42A27DB-BD31-4B8C-83A1-F6EECF244321}">
-                <p14:modId xmlns:p14="http://schemas.microsoft.com/office/powerpoint/2010/main" val="3972743493"/>
+                <p14:modId xmlns:p14="http://schemas.microsoft.com/office/powerpoint/2010/main" val="3951997763"/>
               </p:ext>
             </p:extLst>
           </p:nvPr>
@@ -14497,14 +14497,14 @@
                     </a:ext>
                   </a:extLst>
                 </a:gridCol>
-                <a:gridCol w="880209">
+                <a:gridCol w="1022630">
                   <a:extLst>
                     <a:ext uri="{9D8B030D-6E8A-4147-A177-3AD203B41FA5}">
                       <a16:colId xmlns:a16="http://schemas.microsoft.com/office/drawing/2014/main" val="1983927"/>
                     </a:ext>
                   </a:extLst>
                 </a:gridCol>
-                <a:gridCol w="1575913">
+                <a:gridCol w="1433492">
                   <a:extLst>
                     <a:ext uri="{9D8B030D-6E8A-4147-A177-3AD203B41FA5}">
                       <a16:colId xmlns:a16="http://schemas.microsoft.com/office/drawing/2014/main" val="4080472763"/>
@@ -14761,7 +14761,7 @@
                             <a:schemeClr val="tx1"/>
                           </a:solidFill>
                         </a:rPr>
-                        <a:t>Curve</a:t>
+                        <a:t>Curve Batch</a:t>
                       </a:r>
                     </a:p>
                     <a:p>
@@ -14989,7 +14989,7 @@
           <p:nvPr>
             <p:extLst>
               <p:ext uri="{D42A27DB-BD31-4B8C-83A1-F6EECF244321}">
-                <p14:modId xmlns:p14="http://schemas.microsoft.com/office/powerpoint/2010/main" val="2287144069"/>
+                <p14:modId xmlns:p14="http://schemas.microsoft.com/office/powerpoint/2010/main" val="1984437542"/>
               </p:ext>
             </p:extLst>
           </p:nvPr>
@@ -15012,14 +15012,14 @@
                     </a:ext>
                   </a:extLst>
                 </a:gridCol>
-                <a:gridCol w="882453">
+                <a:gridCol w="1018719">
                   <a:extLst>
                     <a:ext uri="{9D8B030D-6E8A-4147-A177-3AD203B41FA5}">
                       <a16:colId xmlns:a16="http://schemas.microsoft.com/office/drawing/2014/main" val="1983927"/>
                     </a:ext>
                   </a:extLst>
                 </a:gridCol>
-                <a:gridCol w="1573669">
+                <a:gridCol w="1437403">
                   <a:extLst>
                     <a:ext uri="{9D8B030D-6E8A-4147-A177-3AD203B41FA5}">
                       <a16:colId xmlns:a16="http://schemas.microsoft.com/office/drawing/2014/main" val="3273070592"/>
@@ -15265,7 +15265,7 @@
                             <a:schemeClr val="tx1"/>
                           </a:solidFill>
                         </a:rPr>
-                        <a:t>Curve</a:t>
+                        <a:t>Curve Batch</a:t>
                       </a:r>
                     </a:p>
                     <a:p>
@@ -15493,7 +15493,7 @@
           <p:nvPr>
             <p:extLst>
               <p:ext uri="{D42A27DB-BD31-4B8C-83A1-F6EECF244321}">
-                <p14:modId xmlns:p14="http://schemas.microsoft.com/office/powerpoint/2010/main" val="558481014"/>
+                <p14:modId xmlns:p14="http://schemas.microsoft.com/office/powerpoint/2010/main" val="1059908137"/>
               </p:ext>
             </p:extLst>
           </p:nvPr>
@@ -15701,7 +15701,7 @@
                             <a:schemeClr val="tx1"/>
                           </a:solidFill>
                         </a:rPr>
-                        <a:t>Curve</a:t>
+                        <a:t>Curve Batch</a:t>
                       </a:r>
                     </a:p>
                     <a:p>
@@ -15844,7 +15844,7 @@
           <p:nvPr>
             <p:extLst>
               <p:ext uri="{D42A27DB-BD31-4B8C-83A1-F6EECF244321}">
-                <p14:modId xmlns:p14="http://schemas.microsoft.com/office/powerpoint/2010/main" val="692602708"/>
+                <p14:modId xmlns:p14="http://schemas.microsoft.com/office/powerpoint/2010/main" val="1335358794"/>
               </p:ext>
             </p:extLst>
           </p:nvPr>
@@ -16061,7 +16061,7 @@
                             <a:schemeClr val="tx1"/>
                           </a:solidFill>
                         </a:rPr>
-                        <a:t>Curve</a:t>
+                        <a:t>Curve Batch</a:t>
                       </a:r>
                     </a:p>
                     <a:p>
@@ -16286,14 +16286,14 @@
           <p:nvPr>
             <p:extLst>
               <p:ext uri="{D42A27DB-BD31-4B8C-83A1-F6EECF244321}">
-                <p14:modId xmlns:p14="http://schemas.microsoft.com/office/powerpoint/2010/main" val="2615772611"/>
+                <p14:modId xmlns:p14="http://schemas.microsoft.com/office/powerpoint/2010/main" val="2125985701"/>
               </p:ext>
             </p:extLst>
           </p:nvPr>
         </p:nvGraphicFramePr>
         <p:xfrm>
-          <a:off x="2023837" y="-554839"/>
-          <a:ext cx="2183008" cy="886771"/>
+          <a:off x="1896837" y="-554839"/>
+          <a:ext cx="2492982" cy="886771"/>
         </p:xfrm>
         <a:graphic>
           <a:graphicData uri="http://schemas.openxmlformats.org/drawingml/2006/table">
@@ -16302,14 +16302,14 @@
                 <a:tableStyleId>{5C22544A-7EE6-4342-B048-85BDC9FD1C3A}</a:tableStyleId>
               </a:tblPr>
               <a:tblGrid>
-                <a:gridCol w="911321">
+                <a:gridCol w="1040723">
                   <a:extLst>
                     <a:ext uri="{9D8B030D-6E8A-4147-A177-3AD203B41FA5}">
                       <a16:colId xmlns:a16="http://schemas.microsoft.com/office/drawing/2014/main" val="3999788392"/>
                     </a:ext>
                   </a:extLst>
                 </a:gridCol>
-                <a:gridCol w="1271687">
+                <a:gridCol w="1452259">
                   <a:extLst>
                     <a:ext uri="{9D8B030D-6E8A-4147-A177-3AD203B41FA5}">
                       <a16:colId xmlns:a16="http://schemas.microsoft.com/office/drawing/2014/main" val="1983927"/>
@@ -16330,7 +16330,7 @@
                             <a:schemeClr val="tx1"/>
                           </a:solidFill>
                         </a:rPr>
-                        <a:t>Curve Annotation</a:t>
+                        <a:t>Curve Batch Annotation</a:t>
                       </a:r>
                     </a:p>
                   </a:txBody>
@@ -16469,7 +16469,7 @@
                             <a:schemeClr val="tx1"/>
                           </a:solidFill>
                         </a:rPr>
-                        <a:t>Curve</a:t>
+                        <a:t>Curve Batch</a:t>
                       </a:r>
                     </a:p>
                     <a:p>
@@ -18090,7 +18090,7 @@
           <p:nvPr>
             <p:extLst>
               <p:ext uri="{D42A27DB-BD31-4B8C-83A1-F6EECF244321}">
-                <p14:modId xmlns:p14="http://schemas.microsoft.com/office/powerpoint/2010/main" val="3192973531"/>
+                <p14:modId xmlns:p14="http://schemas.microsoft.com/office/powerpoint/2010/main" val="1614059454"/>
               </p:ext>
             </p:extLst>
           </p:nvPr>
@@ -18113,7 +18113,7 @@
                     </a:ext>
                   </a:extLst>
                 </a:gridCol>
-                <a:gridCol w="914400">
+                <a:gridCol w="1022350">
                   <a:extLst>
                     <a:ext uri="{9D8B030D-6E8A-4147-A177-3AD203B41FA5}">
                       <a16:colId xmlns:a16="http://schemas.microsoft.com/office/drawing/2014/main" val="694209082"/>
@@ -18127,7 +18127,7 @@
                     </a:ext>
                   </a:extLst>
                 </a:gridCol>
-                <a:gridCol w="844108">
+                <a:gridCol w="736158">
                   <a:extLst>
                     <a:ext uri="{9D8B030D-6E8A-4147-A177-3AD203B41FA5}">
                       <a16:colId xmlns:a16="http://schemas.microsoft.com/office/drawing/2014/main" val="3930359769"/>
@@ -18643,7 +18643,7 @@
                             <a:schemeClr val="tx1"/>
                           </a:solidFill>
                         </a:rPr>
-                        <a:t>Curve</a:t>
+                        <a:t>Curve Batch</a:t>
                       </a:r>
                     </a:p>
                     <a:p>
@@ -19149,8 +19149,8 @@
           </a:xfrm>
           <a:prstGeom prst="bentConnector4">
             <a:avLst>
-              <a:gd name="adj1" fmla="val 9390"/>
-              <a:gd name="adj2" fmla="val 121543"/>
+              <a:gd name="adj1" fmla="val 7293"/>
+              <a:gd name="adj2" fmla="val 121417"/>
             </a:avLst>
           </a:prstGeom>
           <a:ln>
@@ -19198,8 +19198,8 @@
           </a:xfrm>
           <a:prstGeom prst="bentConnector4">
             <a:avLst>
-              <a:gd name="adj1" fmla="val 4644"/>
-              <a:gd name="adj2" fmla="val 121529"/>
+              <a:gd name="adj1" fmla="val 3563"/>
+              <a:gd name="adj2" fmla="val 121292"/>
             </a:avLst>
           </a:prstGeom>
           <a:ln>
@@ -19461,10 +19461,10 @@
       </p:grpSpPr>
       <p:pic>
         <p:nvPicPr>
-          <p:cNvPr id="3" name="Picture 2">
+          <p:cNvPr id="4" name="Picture 3">
             <a:extLst>
               <a:ext uri="{FF2B5EF4-FFF2-40B4-BE49-F238E27FC236}">
-                <a16:creationId xmlns:a16="http://schemas.microsoft.com/office/drawing/2014/main" id="{B2821881-162A-48A2-B663-C0078D256541}"/>
+                <a16:creationId xmlns:a16="http://schemas.microsoft.com/office/drawing/2014/main" id="{3E347175-FF6D-4E35-94FE-32F3D2CC80BF}"/>
               </a:ext>
             </a:extLst>
           </p:cNvPr>
@@ -19487,8 +19487,8 @@
         </p:blipFill>
         <p:spPr>
           <a:xfrm>
-            <a:off x="410347" y="0"/>
-            <a:ext cx="11371306" cy="6858000"/>
+            <a:off x="412664" y="0"/>
+            <a:ext cx="11366672" cy="6858000"/>
           </a:xfrm>
           <a:prstGeom prst="rect">
             <a:avLst/>

</xml_diff>